<commit_message>
Imagen de fondo mejorada
</commit_message>
<xml_diff>
--- a/src/main/resources/static/fondo.pptx
+++ b/src/main/resources/static/fondo.pptx
@@ -2,12 +2,15 @@
 <file path=ppt/presentation.xml><?xml version="1.0" encoding="utf-8"?>
 <p:presentation xmlns:a="http://schemas.openxmlformats.org/drawingml/2006/main" xmlns:r="http://schemas.openxmlformats.org/officeDocument/2006/relationships" xmlns:p="http://schemas.openxmlformats.org/presentationml/2006/main" saveSubsetFonts="1">
   <p:sldMasterIdLst>
-    <p:sldMasterId id="2147483672" r:id="rId1"/>
+    <p:sldMasterId id="2147483912" r:id="rId1"/>
   </p:sldMasterIdLst>
   <p:sldIdLst>
     <p:sldId id="256" r:id="rId2"/>
     <p:sldId id="257" r:id="rId3"/>
-    <p:sldId id="258" r:id="rId4"/>
+    <p:sldId id="261" r:id="rId4"/>
+    <p:sldId id="260" r:id="rId5"/>
+    <p:sldId id="259" r:id="rId6"/>
+    <p:sldId id="258" r:id="rId7"/>
   </p:sldIdLst>
   <p:sldSz cx="12192000" cy="6858000"/>
   <p:notesSz cx="6858000" cy="9144000"/>
@@ -106,11 +109,335 @@
       </a:defRPr>
     </a:lvl9pPr>
   </p:defaultTextStyle>
+  <p:extLst>
+    <p:ext uri="{EFAFB233-063F-42B5-8137-9DF3F51BA10A}">
+      <p15:sldGuideLst xmlns:p15="http://schemas.microsoft.com/office/powerpoint/2012/main"/>
+    </p:ext>
+  </p:extLst>
 </p:presentation>
 </file>
 
 <file path=ppt/changesInfos/changesInfo1.xml><?xml version="1.0" encoding="utf-8"?>
 <pc:chgInfo xmlns:a="http://schemas.openxmlformats.org/drawingml/2006/main" xmlns:r="http://schemas.openxmlformats.org/officeDocument/2006/relationships" xmlns:ac="http://schemas.microsoft.com/office/drawing/2013/main/command" xmlns:pc="http://schemas.microsoft.com/office/powerpoint/2013/main/command">
+  <pc:docChgLst>
+    <pc:chgData name="JUAN SEBASTIAN FRASICA GALEANO" userId="128aa009-e141-41b9-a618-d481cff12e1e" providerId="ADAL" clId="{CD958924-784D-46DF-B195-C4120D2D0A7D}"/>
+    <pc:docChg chg="custSel modSld">
+      <pc:chgData name="JUAN SEBASTIAN FRASICA GALEANO" userId="128aa009-e141-41b9-a618-d481cff12e1e" providerId="ADAL" clId="{CD958924-784D-46DF-B195-C4120D2D0A7D}" dt="2020-03-23T23:15:27.935" v="70"/>
+      <pc:docMkLst>
+        <pc:docMk/>
+      </pc:docMkLst>
+      <pc:sldChg chg="addSp delSp">
+        <pc:chgData name="JUAN SEBASTIAN FRASICA GALEANO" userId="128aa009-e141-41b9-a618-d481cff12e1e" providerId="ADAL" clId="{CD958924-784D-46DF-B195-C4120D2D0A7D}" dt="2020-03-23T23:15:27.935" v="70"/>
+        <pc:sldMkLst>
+          <pc:docMk/>
+          <pc:sldMk cId="1880519016" sldId="256"/>
+        </pc:sldMkLst>
+        <pc:picChg chg="add">
+          <ac:chgData name="JUAN SEBASTIAN FRASICA GALEANO" userId="128aa009-e141-41b9-a618-d481cff12e1e" providerId="ADAL" clId="{CD958924-784D-46DF-B195-C4120D2D0A7D}" dt="2020-03-23T23:15:27.935" v="70"/>
+          <ac:picMkLst>
+            <pc:docMk/>
+            <pc:sldMk cId="1880519016" sldId="256"/>
+            <ac:picMk id="13" creationId="{B0598DBD-0F5D-4CAC-83C5-B3C1315F2551}"/>
+          </ac:picMkLst>
+        </pc:picChg>
+        <pc:picChg chg="del">
+          <ac:chgData name="JUAN SEBASTIAN FRASICA GALEANO" userId="128aa009-e141-41b9-a618-d481cff12e1e" providerId="ADAL" clId="{CD958924-784D-46DF-B195-C4120D2D0A7D}" dt="2020-03-23T23:15:26.814" v="69" actId="478"/>
+          <ac:picMkLst>
+            <pc:docMk/>
+            <pc:sldMk cId="1880519016" sldId="256"/>
+            <ac:picMk id="14" creationId="{C4B55163-D278-4978-BDB9-99A0E50D2D23}"/>
+          </ac:picMkLst>
+        </pc:picChg>
+        <pc:picChg chg="add">
+          <ac:chgData name="JUAN SEBASTIAN FRASICA GALEANO" userId="128aa009-e141-41b9-a618-d481cff12e1e" providerId="ADAL" clId="{CD958924-784D-46DF-B195-C4120D2D0A7D}" dt="2020-03-23T23:15:27.935" v="70"/>
+          <ac:picMkLst>
+            <pc:docMk/>
+            <pc:sldMk cId="1880519016" sldId="256"/>
+            <ac:picMk id="15" creationId="{54CFAE43-A791-4F2D-A727-25F61C012753}"/>
+          </ac:picMkLst>
+        </pc:picChg>
+        <pc:picChg chg="del">
+          <ac:chgData name="JUAN SEBASTIAN FRASICA GALEANO" userId="128aa009-e141-41b9-a618-d481cff12e1e" providerId="ADAL" clId="{CD958924-784D-46DF-B195-C4120D2D0A7D}" dt="2020-03-23T23:15:26.814" v="69" actId="478"/>
+          <ac:picMkLst>
+            <pc:docMk/>
+            <pc:sldMk cId="1880519016" sldId="256"/>
+            <ac:picMk id="16" creationId="{02B20523-C4A5-4288-9266-E8AF8D5DCEE6}"/>
+          </ac:picMkLst>
+        </pc:picChg>
+        <pc:picChg chg="add">
+          <ac:chgData name="JUAN SEBASTIAN FRASICA GALEANO" userId="128aa009-e141-41b9-a618-d481cff12e1e" providerId="ADAL" clId="{CD958924-784D-46DF-B195-C4120D2D0A7D}" dt="2020-03-23T23:15:27.935" v="70"/>
+          <ac:picMkLst>
+            <pc:docMk/>
+            <pc:sldMk cId="1880519016" sldId="256"/>
+            <ac:picMk id="17" creationId="{8A5312A2-61D3-47B6-AAF8-8B30271B5665}"/>
+          </ac:picMkLst>
+        </pc:picChg>
+        <pc:picChg chg="del">
+          <ac:chgData name="JUAN SEBASTIAN FRASICA GALEANO" userId="128aa009-e141-41b9-a618-d481cff12e1e" providerId="ADAL" clId="{CD958924-784D-46DF-B195-C4120D2D0A7D}" dt="2020-03-23T23:15:26.814" v="69" actId="478"/>
+          <ac:picMkLst>
+            <pc:docMk/>
+            <pc:sldMk cId="1880519016" sldId="256"/>
+            <ac:picMk id="18" creationId="{350D7DC4-D52F-4842-99BC-0AF24CF6CBBB}"/>
+          </ac:picMkLst>
+        </pc:picChg>
+        <pc:picChg chg="add">
+          <ac:chgData name="JUAN SEBASTIAN FRASICA GALEANO" userId="128aa009-e141-41b9-a618-d481cff12e1e" providerId="ADAL" clId="{CD958924-784D-46DF-B195-C4120D2D0A7D}" dt="2020-03-23T23:15:27.935" v="70"/>
+          <ac:picMkLst>
+            <pc:docMk/>
+            <pc:sldMk cId="1880519016" sldId="256"/>
+            <ac:picMk id="19" creationId="{74572B15-86B6-4DF7-85F7-079417AAF727}"/>
+          </ac:picMkLst>
+        </pc:picChg>
+        <pc:picChg chg="del">
+          <ac:chgData name="JUAN SEBASTIAN FRASICA GALEANO" userId="128aa009-e141-41b9-a618-d481cff12e1e" providerId="ADAL" clId="{CD958924-784D-46DF-B195-C4120D2D0A7D}" dt="2020-03-23T23:15:26.814" v="69" actId="478"/>
+          <ac:picMkLst>
+            <pc:docMk/>
+            <pc:sldMk cId="1880519016" sldId="256"/>
+            <ac:picMk id="20" creationId="{F4067141-488B-4E65-983B-27380D314476}"/>
+          </ac:picMkLst>
+        </pc:picChg>
+        <pc:picChg chg="add">
+          <ac:chgData name="JUAN SEBASTIAN FRASICA GALEANO" userId="128aa009-e141-41b9-a618-d481cff12e1e" providerId="ADAL" clId="{CD958924-784D-46DF-B195-C4120D2D0A7D}" dt="2020-03-23T23:15:27.935" v="70"/>
+          <ac:picMkLst>
+            <pc:docMk/>
+            <pc:sldMk cId="1880519016" sldId="256"/>
+            <ac:picMk id="21" creationId="{44DA105B-5890-4328-83B1-766FC7771890}"/>
+          </ac:picMkLst>
+        </pc:picChg>
+        <pc:picChg chg="del">
+          <ac:chgData name="JUAN SEBASTIAN FRASICA GALEANO" userId="128aa009-e141-41b9-a618-d481cff12e1e" providerId="ADAL" clId="{CD958924-784D-46DF-B195-C4120D2D0A7D}" dt="2020-03-23T23:15:26.814" v="69" actId="478"/>
+          <ac:picMkLst>
+            <pc:docMk/>
+            <pc:sldMk cId="1880519016" sldId="256"/>
+            <ac:picMk id="22" creationId="{BA07E1E0-D85C-4FB4-9E0C-12D4395EB143}"/>
+          </ac:picMkLst>
+        </pc:picChg>
+        <pc:picChg chg="add">
+          <ac:chgData name="JUAN SEBASTIAN FRASICA GALEANO" userId="128aa009-e141-41b9-a618-d481cff12e1e" providerId="ADAL" clId="{CD958924-784D-46DF-B195-C4120D2D0A7D}" dt="2020-03-23T23:15:27.935" v="70"/>
+          <ac:picMkLst>
+            <pc:docMk/>
+            <pc:sldMk cId="1880519016" sldId="256"/>
+            <ac:picMk id="23" creationId="{10F1892C-E297-4390-B330-6BD0A20B5AED}"/>
+          </ac:picMkLst>
+        </pc:picChg>
+        <pc:picChg chg="del">
+          <ac:chgData name="JUAN SEBASTIAN FRASICA GALEANO" userId="128aa009-e141-41b9-a618-d481cff12e1e" providerId="ADAL" clId="{CD958924-784D-46DF-B195-C4120D2D0A7D}" dt="2020-03-23T23:15:26.814" v="69" actId="478"/>
+          <ac:picMkLst>
+            <pc:docMk/>
+            <pc:sldMk cId="1880519016" sldId="256"/>
+            <ac:picMk id="24" creationId="{A682C322-9733-4269-800D-65F481645DBA}"/>
+          </ac:picMkLst>
+        </pc:picChg>
+        <pc:picChg chg="add">
+          <ac:chgData name="JUAN SEBASTIAN FRASICA GALEANO" userId="128aa009-e141-41b9-a618-d481cff12e1e" providerId="ADAL" clId="{CD958924-784D-46DF-B195-C4120D2D0A7D}" dt="2020-03-23T23:15:27.935" v="70"/>
+          <ac:picMkLst>
+            <pc:docMk/>
+            <pc:sldMk cId="1880519016" sldId="256"/>
+            <ac:picMk id="25" creationId="{42D9E5FA-8DB4-440D-9D7C-7253EF5ECF60}"/>
+          </ac:picMkLst>
+        </pc:picChg>
+        <pc:picChg chg="del">
+          <ac:chgData name="JUAN SEBASTIAN FRASICA GALEANO" userId="128aa009-e141-41b9-a618-d481cff12e1e" providerId="ADAL" clId="{CD958924-784D-46DF-B195-C4120D2D0A7D}" dt="2020-03-23T23:15:26.814" v="69" actId="478"/>
+          <ac:picMkLst>
+            <pc:docMk/>
+            <pc:sldMk cId="1880519016" sldId="256"/>
+            <ac:picMk id="26" creationId="{27BB29DB-7445-466D-A136-EA6B4F78959F}"/>
+          </ac:picMkLst>
+        </pc:picChg>
+        <pc:picChg chg="del">
+          <ac:chgData name="JUAN SEBASTIAN FRASICA GALEANO" userId="128aa009-e141-41b9-a618-d481cff12e1e" providerId="ADAL" clId="{CD958924-784D-46DF-B195-C4120D2D0A7D}" dt="2020-03-23T23:15:26.814" v="69" actId="478"/>
+          <ac:picMkLst>
+            <pc:docMk/>
+            <pc:sldMk cId="1880519016" sldId="256"/>
+            <ac:picMk id="27" creationId="{CB16D729-1A41-4477-ADA7-F5F13A358018}"/>
+          </ac:picMkLst>
+        </pc:picChg>
+        <pc:picChg chg="del">
+          <ac:chgData name="JUAN SEBASTIAN FRASICA GALEANO" userId="128aa009-e141-41b9-a618-d481cff12e1e" providerId="ADAL" clId="{CD958924-784D-46DF-B195-C4120D2D0A7D}" dt="2020-03-23T23:15:26.814" v="69" actId="478"/>
+          <ac:picMkLst>
+            <pc:docMk/>
+            <pc:sldMk cId="1880519016" sldId="256"/>
+            <ac:picMk id="28" creationId="{65D9DE0F-0F12-478F-AFF3-5848E1D59926}"/>
+          </ac:picMkLst>
+        </pc:picChg>
+        <pc:picChg chg="del">
+          <ac:chgData name="JUAN SEBASTIAN FRASICA GALEANO" userId="128aa009-e141-41b9-a618-d481cff12e1e" providerId="ADAL" clId="{CD958924-784D-46DF-B195-C4120D2D0A7D}" dt="2020-03-23T23:15:26.814" v="69" actId="478"/>
+          <ac:picMkLst>
+            <pc:docMk/>
+            <pc:sldMk cId="1880519016" sldId="256"/>
+            <ac:picMk id="29" creationId="{45833D6F-B0BC-47A6-BF15-83F89FA91A38}"/>
+          </ac:picMkLst>
+        </pc:picChg>
+        <pc:picChg chg="del">
+          <ac:chgData name="JUAN SEBASTIAN FRASICA GALEANO" userId="128aa009-e141-41b9-a618-d481cff12e1e" providerId="ADAL" clId="{CD958924-784D-46DF-B195-C4120D2D0A7D}" dt="2020-03-23T23:15:26.814" v="69" actId="478"/>
+          <ac:picMkLst>
+            <pc:docMk/>
+            <pc:sldMk cId="1880519016" sldId="256"/>
+            <ac:picMk id="30" creationId="{906CAC30-C04E-4C12-9977-5045943F9644}"/>
+          </ac:picMkLst>
+        </pc:picChg>
+        <pc:picChg chg="add">
+          <ac:chgData name="JUAN SEBASTIAN FRASICA GALEANO" userId="128aa009-e141-41b9-a618-d481cff12e1e" providerId="ADAL" clId="{CD958924-784D-46DF-B195-C4120D2D0A7D}" dt="2020-03-23T23:15:27.935" v="70"/>
+          <ac:picMkLst>
+            <pc:docMk/>
+            <pc:sldMk cId="1880519016" sldId="256"/>
+            <ac:picMk id="31" creationId="{463CF2B4-A661-44E0-8CF0-04D797F655B6}"/>
+          </ac:picMkLst>
+        </pc:picChg>
+        <pc:picChg chg="add">
+          <ac:chgData name="JUAN SEBASTIAN FRASICA GALEANO" userId="128aa009-e141-41b9-a618-d481cff12e1e" providerId="ADAL" clId="{CD958924-784D-46DF-B195-C4120D2D0A7D}" dt="2020-03-23T23:15:27.935" v="70"/>
+          <ac:picMkLst>
+            <pc:docMk/>
+            <pc:sldMk cId="1880519016" sldId="256"/>
+            <ac:picMk id="32" creationId="{7E81A099-2CEE-45B0-AF8C-FDD739644B58}"/>
+          </ac:picMkLst>
+        </pc:picChg>
+        <pc:picChg chg="add">
+          <ac:chgData name="JUAN SEBASTIAN FRASICA GALEANO" userId="128aa009-e141-41b9-a618-d481cff12e1e" providerId="ADAL" clId="{CD958924-784D-46DF-B195-C4120D2D0A7D}" dt="2020-03-23T23:15:27.935" v="70"/>
+          <ac:picMkLst>
+            <pc:docMk/>
+            <pc:sldMk cId="1880519016" sldId="256"/>
+            <ac:picMk id="33" creationId="{EEE9E57A-1121-44C6-B637-1F4B60E0E7AB}"/>
+          </ac:picMkLst>
+        </pc:picChg>
+        <pc:picChg chg="add">
+          <ac:chgData name="JUAN SEBASTIAN FRASICA GALEANO" userId="128aa009-e141-41b9-a618-d481cff12e1e" providerId="ADAL" clId="{CD958924-784D-46DF-B195-C4120D2D0A7D}" dt="2020-03-23T23:15:27.935" v="70"/>
+          <ac:picMkLst>
+            <pc:docMk/>
+            <pc:sldMk cId="1880519016" sldId="256"/>
+            <ac:picMk id="34" creationId="{B5AE0FF9-6840-4C8B-AD97-2B7AD4ABF1AF}"/>
+          </ac:picMkLst>
+        </pc:picChg>
+        <pc:picChg chg="add">
+          <ac:chgData name="JUAN SEBASTIAN FRASICA GALEANO" userId="128aa009-e141-41b9-a618-d481cff12e1e" providerId="ADAL" clId="{CD958924-784D-46DF-B195-C4120D2D0A7D}" dt="2020-03-23T23:15:27.935" v="70"/>
+          <ac:picMkLst>
+            <pc:docMk/>
+            <pc:sldMk cId="1880519016" sldId="256"/>
+            <ac:picMk id="35" creationId="{AE1535A6-5412-431B-977A-B3252BBF1C2E}"/>
+          </ac:picMkLst>
+        </pc:picChg>
+        <pc:picChg chg="add">
+          <ac:chgData name="JUAN SEBASTIAN FRASICA GALEANO" userId="128aa009-e141-41b9-a618-d481cff12e1e" providerId="ADAL" clId="{CD958924-784D-46DF-B195-C4120D2D0A7D}" dt="2020-03-23T23:15:27.935" v="70"/>
+          <ac:picMkLst>
+            <pc:docMk/>
+            <pc:sldMk cId="1880519016" sldId="256"/>
+            <ac:picMk id="36" creationId="{666A181C-97BF-4D8A-9738-6D16CE97B041}"/>
+          </ac:picMkLst>
+        </pc:picChg>
+        <pc:picChg chg="add">
+          <ac:chgData name="JUAN SEBASTIAN FRASICA GALEANO" userId="128aa009-e141-41b9-a618-d481cff12e1e" providerId="ADAL" clId="{CD958924-784D-46DF-B195-C4120D2D0A7D}" dt="2020-03-23T23:15:27.935" v="70"/>
+          <ac:picMkLst>
+            <pc:docMk/>
+            <pc:sldMk cId="1880519016" sldId="256"/>
+            <ac:picMk id="37" creationId="{A41520F8-4363-43DD-9480-C4BE5DD8CD40}"/>
+          </ac:picMkLst>
+        </pc:picChg>
+      </pc:sldChg>
+      <pc:sldChg chg="addSp modSp">
+        <pc:chgData name="JUAN SEBASTIAN FRASICA GALEANO" userId="128aa009-e141-41b9-a618-d481cff12e1e" providerId="ADAL" clId="{CD958924-784D-46DF-B195-C4120D2D0A7D}" dt="2020-03-23T23:13:44.580" v="68" actId="14100"/>
+        <pc:sldMkLst>
+          <pc:docMk/>
+          <pc:sldMk cId="1799807715" sldId="257"/>
+        </pc:sldMkLst>
+        <pc:picChg chg="add mod">
+          <ac:chgData name="JUAN SEBASTIAN FRASICA GALEANO" userId="128aa009-e141-41b9-a618-d481cff12e1e" providerId="ADAL" clId="{CD958924-784D-46DF-B195-C4120D2D0A7D}" dt="2020-03-23T23:12:40.917" v="52" actId="1076"/>
+          <ac:picMkLst>
+            <pc:docMk/>
+            <pc:sldMk cId="1799807715" sldId="257"/>
+            <ac:picMk id="3" creationId="{81A538A7-C181-4CE2-9E2B-285FBD7138A3}"/>
+          </ac:picMkLst>
+        </pc:picChg>
+        <pc:picChg chg="add mod">
+          <ac:chgData name="JUAN SEBASTIAN FRASICA GALEANO" userId="128aa009-e141-41b9-a618-d481cff12e1e" providerId="ADAL" clId="{CD958924-784D-46DF-B195-C4120D2D0A7D}" dt="2020-03-23T23:13:31.140" v="59" actId="1076"/>
+          <ac:picMkLst>
+            <pc:docMk/>
+            <pc:sldMk cId="1799807715" sldId="257"/>
+            <ac:picMk id="5" creationId="{B69AB3BD-2550-4DA0-912A-B15E659D09B3}"/>
+          </ac:picMkLst>
+        </pc:picChg>
+        <pc:picChg chg="add mod">
+          <ac:chgData name="JUAN SEBASTIAN FRASICA GALEANO" userId="128aa009-e141-41b9-a618-d481cff12e1e" providerId="ADAL" clId="{CD958924-784D-46DF-B195-C4120D2D0A7D}" dt="2020-03-23T23:13:41.068" v="66" actId="1076"/>
+          <ac:picMkLst>
+            <pc:docMk/>
+            <pc:sldMk cId="1799807715" sldId="257"/>
+            <ac:picMk id="7" creationId="{85424FE2-A148-439A-8370-4279B604832A}"/>
+          </ac:picMkLst>
+        </pc:picChg>
+        <pc:picChg chg="mod">
+          <ac:chgData name="JUAN SEBASTIAN FRASICA GALEANO" userId="128aa009-e141-41b9-a618-d481cff12e1e" providerId="ADAL" clId="{CD958924-784D-46DF-B195-C4120D2D0A7D}" dt="2020-03-23T23:13:27.669" v="57" actId="1076"/>
+          <ac:picMkLst>
+            <pc:docMk/>
+            <pc:sldMk cId="1799807715" sldId="257"/>
+            <ac:picMk id="11" creationId="{7E29A13A-3414-4354-8B05-03B021ED58A1}"/>
+          </ac:picMkLst>
+        </pc:picChg>
+        <pc:picChg chg="mod">
+          <ac:chgData name="JUAN SEBASTIAN FRASICA GALEANO" userId="128aa009-e141-41b9-a618-d481cff12e1e" providerId="ADAL" clId="{CD958924-784D-46DF-B195-C4120D2D0A7D}" dt="2020-03-23T23:12:21.484" v="44" actId="1076"/>
+          <ac:picMkLst>
+            <pc:docMk/>
+            <pc:sldMk cId="1799807715" sldId="257"/>
+            <ac:picMk id="12" creationId="{9D710476-8C3B-44C5-95FD-63FD2B0D4F0A}"/>
+          </ac:picMkLst>
+        </pc:picChg>
+        <pc:picChg chg="mod">
+          <ac:chgData name="JUAN SEBASTIAN FRASICA GALEANO" userId="128aa009-e141-41b9-a618-d481cff12e1e" providerId="ADAL" clId="{CD958924-784D-46DF-B195-C4120D2D0A7D}" dt="2020-03-23T23:12:19.956" v="42" actId="1076"/>
+          <ac:picMkLst>
+            <pc:docMk/>
+            <pc:sldMk cId="1799807715" sldId="257"/>
+            <ac:picMk id="13" creationId="{7501DBB9-B5CB-45E8-A48E-4ACDCE7ECB5B}"/>
+          </ac:picMkLst>
+        </pc:picChg>
+        <pc:picChg chg="mod">
+          <ac:chgData name="JUAN SEBASTIAN FRASICA GALEANO" userId="128aa009-e141-41b9-a618-d481cff12e1e" providerId="ADAL" clId="{CD958924-784D-46DF-B195-C4120D2D0A7D}" dt="2020-03-23T23:13:33.061" v="60" actId="1076"/>
+          <ac:picMkLst>
+            <pc:docMk/>
+            <pc:sldMk cId="1799807715" sldId="257"/>
+            <ac:picMk id="14" creationId="{5ADA86BC-5186-4C26-82D1-B3AB6601100D}"/>
+          </ac:picMkLst>
+        </pc:picChg>
+        <pc:picChg chg="mod">
+          <ac:chgData name="JUAN SEBASTIAN FRASICA GALEANO" userId="128aa009-e141-41b9-a618-d481cff12e1e" providerId="ADAL" clId="{CD958924-784D-46DF-B195-C4120D2D0A7D}" dt="2020-03-23T23:12:27.885" v="46" actId="14100"/>
+          <ac:picMkLst>
+            <pc:docMk/>
+            <pc:sldMk cId="1799807715" sldId="257"/>
+            <ac:picMk id="15" creationId="{4ECF6A80-1ADA-438A-862F-62C5E8C409CD}"/>
+          </ac:picMkLst>
+        </pc:picChg>
+        <pc:picChg chg="mod">
+          <ac:chgData name="JUAN SEBASTIAN FRASICA GALEANO" userId="128aa009-e141-41b9-a618-d481cff12e1e" providerId="ADAL" clId="{CD958924-784D-46DF-B195-C4120D2D0A7D}" dt="2020-03-23T23:13:41.741" v="67" actId="1076"/>
+          <ac:picMkLst>
+            <pc:docMk/>
+            <pc:sldMk cId="1799807715" sldId="257"/>
+            <ac:picMk id="16" creationId="{25ACDAC8-345C-4877-ABE0-6866E240CB06}"/>
+          </ac:picMkLst>
+        </pc:picChg>
+        <pc:picChg chg="mod">
+          <ac:chgData name="JUAN SEBASTIAN FRASICA GALEANO" userId="128aa009-e141-41b9-a618-d481cff12e1e" providerId="ADAL" clId="{CD958924-784D-46DF-B195-C4120D2D0A7D}" dt="2020-03-23T23:13:44.580" v="68" actId="14100"/>
+          <ac:picMkLst>
+            <pc:docMk/>
+            <pc:sldMk cId="1799807715" sldId="257"/>
+            <ac:picMk id="17" creationId="{9D10DD1E-B612-4760-A260-62DEEFD25C68}"/>
+          </ac:picMkLst>
+        </pc:picChg>
+        <pc:picChg chg="mod">
+          <ac:chgData name="JUAN SEBASTIAN FRASICA GALEANO" userId="128aa009-e141-41b9-a618-d481cff12e1e" providerId="ADAL" clId="{CD958924-784D-46DF-B195-C4120D2D0A7D}" dt="2020-03-23T23:13:38.237" v="64" actId="1076"/>
+          <ac:picMkLst>
+            <pc:docMk/>
+            <pc:sldMk cId="1799807715" sldId="257"/>
+            <ac:picMk id="18" creationId="{4B32FC9D-2693-4212-8204-6242DAD387C4}"/>
+          </ac:picMkLst>
+        </pc:picChg>
+        <pc:picChg chg="mod">
+          <ac:chgData name="JUAN SEBASTIAN FRASICA GALEANO" userId="128aa009-e141-41b9-a618-d481cff12e1e" providerId="ADAL" clId="{CD958924-784D-46DF-B195-C4120D2D0A7D}" dt="2020-03-23T23:13:35.820" v="63" actId="1076"/>
+          <ac:picMkLst>
+            <pc:docMk/>
+            <pc:sldMk cId="1799807715" sldId="257"/>
+            <ac:picMk id="19" creationId="{17CC7011-0182-44FA-B6BF-EDE81343FB12}"/>
+          </ac:picMkLst>
+        </pc:picChg>
+      </pc:sldChg>
+    </pc:docChg>
+  </pc:docChgLst>
   <pc:docChgLst>
     <pc:chgData name="JUAN SEBASTIAN FRASICA GALEANO" userId="128aa009-e141-41b9-a618-d481cff12e1e" providerId="ADAL" clId="{F7B8CCCB-1EB3-4D61-84F3-4C4888E09EBB}"/>
     <pc:docChg chg="modSld">
@@ -344,7 +671,7 @@
               <a:buNone/>
               <a:defRPr sz="3200">
                 <a:solidFill>
-                  <a:srgbClr val="262626"/>
+                  <a:schemeClr val="bg1"/>
                 </a:solidFill>
                 <a:latin typeface="+mj-lt"/>
               </a:defRPr>
@@ -418,7 +745,7 @@
           <a:p>
             <a:fld id="{F7B90282-6E72-4860-B386-5E3009371AFE}" type="datetimeFigureOut">
               <a:rPr lang="es-CO" smtClean="0"/>
-              <a:t>13/03/2020</a:t>
+              <a:t>23/03/2020</a:t>
             </a:fld>
             <a:endParaRPr lang="es-CO"/>
           </a:p>
@@ -489,7 +816,7 @@
     </p:spTree>
     <p:extLst>
       <p:ext uri="{BB962C8B-B14F-4D97-AF65-F5344CB8AC3E}">
-        <p14:creationId xmlns:p14="http://schemas.microsoft.com/office/powerpoint/2010/main" val="4255651420"/>
+        <p14:creationId xmlns:p14="http://schemas.microsoft.com/office/powerpoint/2010/main" val="207695103"/>
       </p:ext>
     </p:extLst>
   </p:cSld>
@@ -608,7 +935,7 @@
           <a:p>
             <a:fld id="{F7B90282-6E72-4860-B386-5E3009371AFE}" type="datetimeFigureOut">
               <a:rPr lang="es-CO" smtClean="0"/>
-              <a:t>13/03/2020</a:t>
+              <a:t>23/03/2020</a:t>
             </a:fld>
             <a:endParaRPr lang="es-CO"/>
           </a:p>
@@ -659,7 +986,7 @@
     </p:spTree>
     <p:extLst>
       <p:ext uri="{BB962C8B-B14F-4D97-AF65-F5344CB8AC3E}">
-        <p14:creationId xmlns:p14="http://schemas.microsoft.com/office/powerpoint/2010/main" val="1108114534"/>
+        <p14:creationId xmlns:p14="http://schemas.microsoft.com/office/powerpoint/2010/main" val="4186742484"/>
       </p:ext>
     </p:extLst>
   </p:cSld>
@@ -788,7 +1115,7 @@
           <a:p>
             <a:fld id="{F7B90282-6E72-4860-B386-5E3009371AFE}" type="datetimeFigureOut">
               <a:rPr lang="es-CO" smtClean="0"/>
-              <a:t>13/03/2020</a:t>
+              <a:t>23/03/2020</a:t>
             </a:fld>
             <a:endParaRPr lang="es-CO"/>
           </a:p>
@@ -839,7 +1166,7 @@
     </p:spTree>
     <p:extLst>
       <p:ext uri="{BB962C8B-B14F-4D97-AF65-F5344CB8AC3E}">
-        <p14:creationId xmlns:p14="http://schemas.microsoft.com/office/powerpoint/2010/main" val="493473081"/>
+        <p14:creationId xmlns:p14="http://schemas.microsoft.com/office/powerpoint/2010/main" val="888592167"/>
       </p:ext>
     </p:extLst>
   </p:cSld>
@@ -958,7 +1285,7 @@
           <a:p>
             <a:fld id="{F7B90282-6E72-4860-B386-5E3009371AFE}" type="datetimeFigureOut">
               <a:rPr lang="es-CO" smtClean="0"/>
-              <a:t>13/03/2020</a:t>
+              <a:t>23/03/2020</a:t>
             </a:fld>
             <a:endParaRPr lang="es-CO"/>
           </a:p>
@@ -1009,7 +1336,7 @@
     </p:spTree>
     <p:extLst>
       <p:ext uri="{BB962C8B-B14F-4D97-AF65-F5344CB8AC3E}">
-        <p14:creationId xmlns:p14="http://schemas.microsoft.com/office/powerpoint/2010/main" val="294731818"/>
+        <p14:creationId xmlns:p14="http://schemas.microsoft.com/office/powerpoint/2010/main" val="1234064231"/>
       </p:ext>
     </p:extLst>
   </p:cSld>
@@ -1214,7 +1541,7 @@
           <a:p>
             <a:fld id="{F7B90282-6E72-4860-B386-5E3009371AFE}" type="datetimeFigureOut">
               <a:rPr lang="es-CO" smtClean="0"/>
-              <a:t>13/03/2020</a:t>
+              <a:t>23/03/2020</a:t>
             </a:fld>
             <a:endParaRPr lang="es-CO"/>
           </a:p>
@@ -1265,7 +1592,7 @@
     </p:spTree>
     <p:extLst>
       <p:ext uri="{BB962C8B-B14F-4D97-AF65-F5344CB8AC3E}">
-        <p14:creationId xmlns:p14="http://schemas.microsoft.com/office/powerpoint/2010/main" val="2206661733"/>
+        <p14:creationId xmlns:p14="http://schemas.microsoft.com/office/powerpoint/2010/main" val="369817483"/>
       </p:ext>
     </p:extLst>
   </p:cSld>
@@ -1502,7 +1829,7 @@
           <a:p>
             <a:fld id="{F7B90282-6E72-4860-B386-5E3009371AFE}" type="datetimeFigureOut">
               <a:rPr lang="es-CO" smtClean="0"/>
-              <a:t>13/03/2020</a:t>
+              <a:t>23/03/2020</a:t>
             </a:fld>
             <a:endParaRPr lang="es-CO"/>
           </a:p>
@@ -1553,7 +1880,7 @@
     </p:spTree>
     <p:extLst>
       <p:ext uri="{BB962C8B-B14F-4D97-AF65-F5344CB8AC3E}">
-        <p14:creationId xmlns:p14="http://schemas.microsoft.com/office/powerpoint/2010/main" val="1620156235"/>
+        <p14:creationId xmlns:p14="http://schemas.microsoft.com/office/powerpoint/2010/main" val="1360429573"/>
       </p:ext>
     </p:extLst>
   </p:cSld>
@@ -1940,7 +2267,7 @@
           <a:p>
             <a:fld id="{F7B90282-6E72-4860-B386-5E3009371AFE}" type="datetimeFigureOut">
               <a:rPr lang="es-CO" smtClean="0"/>
-              <a:t>13/03/2020</a:t>
+              <a:t>23/03/2020</a:t>
             </a:fld>
             <a:endParaRPr lang="es-CO"/>
           </a:p>
@@ -1991,7 +2318,7 @@
     </p:spTree>
     <p:extLst>
       <p:ext uri="{BB962C8B-B14F-4D97-AF65-F5344CB8AC3E}">
-        <p14:creationId xmlns:p14="http://schemas.microsoft.com/office/powerpoint/2010/main" val="4268918336"/>
+        <p14:creationId xmlns:p14="http://schemas.microsoft.com/office/powerpoint/2010/main" val="2948182683"/>
       </p:ext>
     </p:extLst>
   </p:cSld>
@@ -2058,7 +2385,7 @@
           <a:p>
             <a:fld id="{F7B90282-6E72-4860-B386-5E3009371AFE}" type="datetimeFigureOut">
               <a:rPr lang="es-CO" smtClean="0"/>
-              <a:t>13/03/2020</a:t>
+              <a:t>23/03/2020</a:t>
             </a:fld>
             <a:endParaRPr lang="es-CO"/>
           </a:p>
@@ -2109,7 +2436,7 @@
     </p:spTree>
     <p:extLst>
       <p:ext uri="{BB962C8B-B14F-4D97-AF65-F5344CB8AC3E}">
-        <p14:creationId xmlns:p14="http://schemas.microsoft.com/office/powerpoint/2010/main" val="2149225916"/>
+        <p14:creationId xmlns:p14="http://schemas.microsoft.com/office/powerpoint/2010/main" val="571950113"/>
       </p:ext>
     </p:extLst>
   </p:cSld>
@@ -2153,7 +2480,7 @@
           <a:p>
             <a:fld id="{F7B90282-6E72-4860-B386-5E3009371AFE}" type="datetimeFigureOut">
               <a:rPr lang="es-CO" smtClean="0"/>
-              <a:t>13/03/2020</a:t>
+              <a:t>23/03/2020</a:t>
             </a:fld>
             <a:endParaRPr lang="es-CO"/>
           </a:p>
@@ -2204,7 +2531,7 @@
     </p:spTree>
     <p:extLst>
       <p:ext uri="{BB962C8B-B14F-4D97-AF65-F5344CB8AC3E}">
-        <p14:creationId xmlns:p14="http://schemas.microsoft.com/office/powerpoint/2010/main" val="175458929"/>
+        <p14:creationId xmlns:p14="http://schemas.microsoft.com/office/powerpoint/2010/main" val="3120901913"/>
       </p:ext>
     </p:extLst>
   </p:cSld>
@@ -2509,7 +2836,7 @@
           <a:p>
             <a:fld id="{F7B90282-6E72-4860-B386-5E3009371AFE}" type="datetimeFigureOut">
               <a:rPr lang="es-CO" smtClean="0"/>
-              <a:t>13/03/2020</a:t>
+              <a:t>23/03/2020</a:t>
             </a:fld>
             <a:endParaRPr lang="es-CO"/>
           </a:p>
@@ -2570,7 +2897,7 @@
     </p:spTree>
     <p:extLst>
       <p:ext uri="{BB962C8B-B14F-4D97-AF65-F5344CB8AC3E}">
-        <p14:creationId xmlns:p14="http://schemas.microsoft.com/office/powerpoint/2010/main" val="758221302"/>
+        <p14:creationId xmlns:p14="http://schemas.microsoft.com/office/powerpoint/2010/main" val="4036916517"/>
       </p:ext>
     </p:extLst>
   </p:cSld>
@@ -2660,8 +2987,8 @@
           </a:xfrm>
           <a:solidFill>
             <a:schemeClr val="accent1">
-              <a:lumMod val="20000"/>
-              <a:lumOff val="80000"/>
+              <a:lumMod val="40000"/>
+              <a:lumOff val="60000"/>
             </a:schemeClr>
           </a:solidFill>
         </p:spPr>
@@ -2825,7 +3152,7 @@
           <a:p>
             <a:fld id="{F7B90282-6E72-4860-B386-5E3009371AFE}" type="datetimeFigureOut">
               <a:rPr lang="es-CO" smtClean="0"/>
-              <a:t>13/03/2020</a:t>
+              <a:t>23/03/2020</a:t>
             </a:fld>
             <a:endParaRPr lang="es-CO"/>
           </a:p>
@@ -2896,7 +3223,7 @@
     </p:spTree>
     <p:extLst>
       <p:ext uri="{BB962C8B-B14F-4D97-AF65-F5344CB8AC3E}">
-        <p14:creationId xmlns:p14="http://schemas.microsoft.com/office/powerpoint/2010/main" val="1193896982"/>
+        <p14:creationId xmlns:p14="http://schemas.microsoft.com/office/powerpoint/2010/main" val="37480879"/>
       </p:ext>
     </p:extLst>
   </p:cSld>
@@ -3058,7 +3385,7 @@
           <a:p>
             <a:fld id="{F7B90282-6E72-4860-B386-5E3009371AFE}" type="datetimeFigureOut">
               <a:rPr lang="es-CO" smtClean="0"/>
-              <a:t>13/03/2020</a:t>
+              <a:t>23/03/2020</a:t>
             </a:fld>
             <a:endParaRPr lang="es-CO"/>
           </a:p>
@@ -3149,23 +3476,23 @@
     </p:spTree>
     <p:extLst>
       <p:ext uri="{BB962C8B-B14F-4D97-AF65-F5344CB8AC3E}">
-        <p14:creationId xmlns:p14="http://schemas.microsoft.com/office/powerpoint/2010/main" val="1826771279"/>
+        <p14:creationId xmlns:p14="http://schemas.microsoft.com/office/powerpoint/2010/main" val="1660296826"/>
       </p:ext>
     </p:extLst>
   </p:cSld>
   <p:clrMap bg1="lt1" tx1="dk1" bg2="lt2" tx2="dk2" accent1="accent1" accent2="accent2" accent3="accent3" accent4="accent4" accent5="accent5" accent6="accent6" hlink="hlink" folHlink="folHlink"/>
   <p:sldLayoutIdLst>
-    <p:sldLayoutId id="2147483673" r:id="rId1"/>
-    <p:sldLayoutId id="2147483674" r:id="rId2"/>
-    <p:sldLayoutId id="2147483675" r:id="rId3"/>
-    <p:sldLayoutId id="2147483676" r:id="rId4"/>
-    <p:sldLayoutId id="2147483677" r:id="rId5"/>
-    <p:sldLayoutId id="2147483678" r:id="rId6"/>
-    <p:sldLayoutId id="2147483679" r:id="rId7"/>
-    <p:sldLayoutId id="2147483680" r:id="rId8"/>
-    <p:sldLayoutId id="2147483681" r:id="rId9"/>
-    <p:sldLayoutId id="2147483682" r:id="rId10"/>
-    <p:sldLayoutId id="2147483683" r:id="rId11"/>
+    <p:sldLayoutId id="2147483913" r:id="rId1"/>
+    <p:sldLayoutId id="2147483914" r:id="rId2"/>
+    <p:sldLayoutId id="2147483915" r:id="rId3"/>
+    <p:sldLayoutId id="2147483916" r:id="rId4"/>
+    <p:sldLayoutId id="2147483917" r:id="rId5"/>
+    <p:sldLayoutId id="2147483918" r:id="rId6"/>
+    <p:sldLayoutId id="2147483919" r:id="rId7"/>
+    <p:sldLayoutId id="2147483920" r:id="rId8"/>
+    <p:sldLayoutId id="2147483921" r:id="rId9"/>
+    <p:sldLayoutId id="2147483922" r:id="rId10"/>
+    <p:sldLayoutId id="2147483923" r:id="rId11"/>
   </p:sldLayoutIdLst>
   <p:txStyles>
     <p:titleStyle>
@@ -3507,10 +3834,10 @@
       </p:grpSpPr>
       <p:pic>
         <p:nvPicPr>
-          <p:cNvPr id="5" name="Imagen 4">
+          <p:cNvPr id="13" name="Imagen 12">
             <a:extLst>
               <a:ext uri="{FF2B5EF4-FFF2-40B4-BE49-F238E27FC236}">
-                <a16:creationId xmlns:a16="http://schemas.microsoft.com/office/drawing/2014/main" id="{00F74AB4-EA5F-464D-AE52-1885247225F5}"/>
+                <a16:creationId xmlns:a16="http://schemas.microsoft.com/office/drawing/2014/main" id="{B0598DBD-0F5D-4CAC-83C5-B3C1315F2551}"/>
               </a:ext>
             </a:extLst>
           </p:cNvPr>
@@ -3541,7 +3868,7 @@
         <p:spPr>
           <a:xfrm>
             <a:off x="1107279" y="554483"/>
-            <a:ext cx="854952" cy="854952"/>
+            <a:ext cx="720001" cy="720001"/>
           </a:xfrm>
           <a:prstGeom prst="rect">
             <a:avLst/>
@@ -3550,10 +3877,10 @@
       </p:pic>
       <p:pic>
         <p:nvPicPr>
-          <p:cNvPr id="7" name="Imagen 6">
+          <p:cNvPr id="15" name="Imagen 14">
             <a:extLst>
               <a:ext uri="{FF2B5EF4-FFF2-40B4-BE49-F238E27FC236}">
-                <a16:creationId xmlns:a16="http://schemas.microsoft.com/office/drawing/2014/main" id="{7570EF13-0BC6-451F-AFF5-550781955467}"/>
+                <a16:creationId xmlns:a16="http://schemas.microsoft.com/office/drawing/2014/main" id="{54CFAE43-A791-4F2D-A727-25F61C012753}"/>
               </a:ext>
             </a:extLst>
           </p:cNvPr>
@@ -3583,8 +3910,8 @@
         </p:blipFill>
         <p:spPr>
           <a:xfrm>
-            <a:off x="1735109" y="5406501"/>
-            <a:ext cx="792067" cy="792067"/>
+            <a:off x="1738245" y="4091654"/>
+            <a:ext cx="667042" cy="667042"/>
           </a:xfrm>
           <a:prstGeom prst="rect">
             <a:avLst/>
@@ -3593,10 +3920,10 @@
       </p:pic>
       <p:pic>
         <p:nvPicPr>
-          <p:cNvPr id="9" name="Imagen 8">
+          <p:cNvPr id="17" name="Imagen 16">
             <a:extLst>
               <a:ext uri="{FF2B5EF4-FFF2-40B4-BE49-F238E27FC236}">
-                <a16:creationId xmlns:a16="http://schemas.microsoft.com/office/drawing/2014/main" id="{78F20683-9CA8-4373-9C9C-E3E12512E080}"/>
+                <a16:creationId xmlns:a16="http://schemas.microsoft.com/office/drawing/2014/main" id="{8A5312A2-61D3-47B6-AAF8-8B30271B5665}"/>
               </a:ext>
             </a:extLst>
           </p:cNvPr>
@@ -3626,8 +3953,8 @@
         </p:blipFill>
         <p:spPr>
           <a:xfrm rot="19351517">
-            <a:off x="3314187" y="525397"/>
-            <a:ext cx="792067" cy="792067"/>
+            <a:off x="2898451" y="735628"/>
+            <a:ext cx="667042" cy="667042"/>
           </a:xfrm>
           <a:prstGeom prst="rect">
             <a:avLst/>
@@ -3636,10 +3963,10 @@
       </p:pic>
       <p:pic>
         <p:nvPicPr>
-          <p:cNvPr id="11" name="Imagen 10">
+          <p:cNvPr id="19" name="Imagen 18">
             <a:extLst>
               <a:ext uri="{FF2B5EF4-FFF2-40B4-BE49-F238E27FC236}">
-                <a16:creationId xmlns:a16="http://schemas.microsoft.com/office/drawing/2014/main" id="{6E86E6F5-9A6E-44F7-9144-B2A0C191DA1E}"/>
+                <a16:creationId xmlns:a16="http://schemas.microsoft.com/office/drawing/2014/main" id="{74572B15-86B6-4DF7-85F7-079417AAF727}"/>
               </a:ext>
             </a:extLst>
           </p:cNvPr>
@@ -3669,8 +3996,8 @@
         </p:blipFill>
         <p:spPr>
           <a:xfrm rot="3484623">
-            <a:off x="2543240" y="3011935"/>
-            <a:ext cx="792067" cy="792067"/>
+            <a:off x="1351715" y="1993355"/>
+            <a:ext cx="667042" cy="667042"/>
           </a:xfrm>
           <a:prstGeom prst="rect">
             <a:avLst/>
@@ -3679,10 +4006,10 @@
       </p:pic>
       <p:pic>
         <p:nvPicPr>
-          <p:cNvPr id="13" name="Imagen 12">
+          <p:cNvPr id="21" name="Imagen 20">
             <a:extLst>
               <a:ext uri="{FF2B5EF4-FFF2-40B4-BE49-F238E27FC236}">
-                <a16:creationId xmlns:a16="http://schemas.microsoft.com/office/drawing/2014/main" id="{9C1A6FB7-BF31-4463-9E0D-62698F493FBF}"/>
+                <a16:creationId xmlns:a16="http://schemas.microsoft.com/office/drawing/2014/main" id="{44DA105B-5890-4328-83B1-766FC7771890}"/>
               </a:ext>
             </a:extLst>
           </p:cNvPr>
@@ -3712,8 +4039,8 @@
         </p:blipFill>
         <p:spPr>
           <a:xfrm rot="16492957">
-            <a:off x="10029417" y="5661794"/>
-            <a:ext cx="854951" cy="854951"/>
+            <a:off x="8999439" y="4521937"/>
+            <a:ext cx="720000" cy="720000"/>
           </a:xfrm>
           <a:prstGeom prst="rect">
             <a:avLst/>
@@ -3722,10 +4049,10 @@
       </p:pic>
       <p:pic>
         <p:nvPicPr>
-          <p:cNvPr id="15" name="Imagen 14">
+          <p:cNvPr id="23" name="Imagen 22">
             <a:extLst>
               <a:ext uri="{FF2B5EF4-FFF2-40B4-BE49-F238E27FC236}">
-                <a16:creationId xmlns:a16="http://schemas.microsoft.com/office/drawing/2014/main" id="{9564E731-1964-41B7-8925-2ABCC2071248}"/>
+                <a16:creationId xmlns:a16="http://schemas.microsoft.com/office/drawing/2014/main" id="{10F1892C-E297-4390-B330-6BD0A20B5AED}"/>
               </a:ext>
             </a:extLst>
           </p:cNvPr>
@@ -3755,8 +4082,8 @@
         </p:blipFill>
         <p:spPr>
           <a:xfrm>
-            <a:off x="8059694" y="643260"/>
-            <a:ext cx="677398" cy="677398"/>
+            <a:off x="8553807" y="690085"/>
+            <a:ext cx="658231" cy="658231"/>
           </a:xfrm>
           <a:prstGeom prst="rect">
             <a:avLst/>
@@ -3765,10 +4092,10 @@
       </p:pic>
       <p:pic>
         <p:nvPicPr>
-          <p:cNvPr id="17" name="Imagen 16">
+          <p:cNvPr id="25" name="Imagen 24">
             <a:extLst>
               <a:ext uri="{FF2B5EF4-FFF2-40B4-BE49-F238E27FC236}">
-                <a16:creationId xmlns:a16="http://schemas.microsoft.com/office/drawing/2014/main" id="{36485863-744E-4604-9B33-FDA592889EF1}"/>
+                <a16:creationId xmlns:a16="http://schemas.microsoft.com/office/drawing/2014/main" id="{42D9E5FA-8DB4-440D-9D7C-7253EF5ECF60}"/>
               </a:ext>
             </a:extLst>
           </p:cNvPr>
@@ -3798,8 +4125,8 @@
         </p:blipFill>
         <p:spPr>
           <a:xfrm>
-            <a:off x="10690043" y="3087911"/>
-            <a:ext cx="682178" cy="682178"/>
+            <a:off x="10966202" y="2070824"/>
+            <a:ext cx="715490" cy="715490"/>
           </a:xfrm>
           <a:prstGeom prst="rect">
             <a:avLst/>
@@ -3808,10 +4135,10 @@
       </p:pic>
       <p:pic>
         <p:nvPicPr>
-          <p:cNvPr id="19" name="Imagen 18">
+          <p:cNvPr id="31" name="Imagen 30">
             <a:extLst>
               <a:ext uri="{FF2B5EF4-FFF2-40B4-BE49-F238E27FC236}">
-                <a16:creationId xmlns:a16="http://schemas.microsoft.com/office/drawing/2014/main" id="{972151B8-7900-46B8-B276-7009BE78A384}"/>
+                <a16:creationId xmlns:a16="http://schemas.microsoft.com/office/drawing/2014/main" id="{463CF2B4-A661-44E0-8CF0-04D797F655B6}"/>
               </a:ext>
             </a:extLst>
           </p:cNvPr>
@@ -3841,8 +4168,8 @@
         </p:blipFill>
         <p:spPr>
           <a:xfrm>
-            <a:off x="8828623" y="3171915"/>
-            <a:ext cx="781605" cy="781605"/>
+            <a:off x="8445995" y="2269618"/>
+            <a:ext cx="715490" cy="715490"/>
           </a:xfrm>
           <a:prstGeom prst="rect">
             <a:avLst/>
@@ -3851,10 +4178,10 @@
       </p:pic>
       <p:pic>
         <p:nvPicPr>
-          <p:cNvPr id="21" name="Imagen 20">
+          <p:cNvPr id="32" name="Imagen 31">
             <a:extLst>
               <a:ext uri="{FF2B5EF4-FFF2-40B4-BE49-F238E27FC236}">
-                <a16:creationId xmlns:a16="http://schemas.microsoft.com/office/drawing/2014/main" id="{1AAE6222-2C8B-41ED-A3BF-DB93E4E7A9D5}"/>
+                <a16:creationId xmlns:a16="http://schemas.microsoft.com/office/drawing/2014/main" id="{7E81A099-2CEE-45B0-AF8C-FDD739644B58}"/>
               </a:ext>
             </a:extLst>
           </p:cNvPr>
@@ -3884,8 +4211,8 @@
         </p:blipFill>
         <p:spPr>
           <a:xfrm>
-            <a:off x="9982293" y="768731"/>
-            <a:ext cx="849596" cy="849596"/>
+            <a:off x="10726976" y="597641"/>
+            <a:ext cx="715490" cy="715490"/>
           </a:xfrm>
           <a:prstGeom prst="rect">
             <a:avLst/>
@@ -3894,10 +4221,10 @@
       </p:pic>
       <p:pic>
         <p:nvPicPr>
-          <p:cNvPr id="23" name="Imagen 22">
+          <p:cNvPr id="33" name="Imagen 32">
             <a:extLst>
               <a:ext uri="{FF2B5EF4-FFF2-40B4-BE49-F238E27FC236}">
-                <a16:creationId xmlns:a16="http://schemas.microsoft.com/office/drawing/2014/main" id="{1D067D91-7F62-48EA-8B7E-CF75226C9B25}"/>
+                <a16:creationId xmlns:a16="http://schemas.microsoft.com/office/drawing/2014/main" id="{EEE9E57A-1121-44C6-B637-1F4B60E0E7AB}"/>
               </a:ext>
             </a:extLst>
           </p:cNvPr>
@@ -3926,9 +4253,9 @@
           </a:stretch>
         </p:blipFill>
         <p:spPr>
-          <a:xfrm rot="16569488">
-            <a:off x="5461661" y="5523230"/>
-            <a:ext cx="854951" cy="854951"/>
+          <a:xfrm rot="4995169">
+            <a:off x="11180891" y="4008598"/>
+            <a:ext cx="710803" cy="710803"/>
           </a:xfrm>
           <a:prstGeom prst="rect">
             <a:avLst/>
@@ -3937,10 +4264,10 @@
       </p:pic>
       <p:pic>
         <p:nvPicPr>
-          <p:cNvPr id="25" name="Imagen 24">
+          <p:cNvPr id="34" name="Imagen 33">
             <a:extLst>
               <a:ext uri="{FF2B5EF4-FFF2-40B4-BE49-F238E27FC236}">
-                <a16:creationId xmlns:a16="http://schemas.microsoft.com/office/drawing/2014/main" id="{5475CFE0-85C4-49A4-9F69-9E0388EC100E}"/>
+                <a16:creationId xmlns:a16="http://schemas.microsoft.com/office/drawing/2014/main" id="{B5AE0FF9-6840-4C8B-AD97-2B7AD4ABF1AF}"/>
               </a:ext>
             </a:extLst>
           </p:cNvPr>
@@ -3970,8 +4297,137 @@
         </p:blipFill>
         <p:spPr>
           <a:xfrm>
-            <a:off x="611101" y="3148559"/>
-            <a:ext cx="694412" cy="694412"/>
+            <a:off x="472573" y="3259108"/>
+            <a:ext cx="584802" cy="584802"/>
+          </a:xfrm>
+          <a:prstGeom prst="rect">
+            <a:avLst/>
+          </a:prstGeom>
+        </p:spPr>
+      </p:pic>
+      <p:pic>
+        <p:nvPicPr>
+          <p:cNvPr id="35" name="Imagen 34">
+            <a:extLst>
+              <a:ext uri="{FF2B5EF4-FFF2-40B4-BE49-F238E27FC236}">
+                <a16:creationId xmlns:a16="http://schemas.microsoft.com/office/drawing/2014/main" id="{AE1535A6-5412-431B-977A-B3252BBF1C2E}"/>
+              </a:ext>
+            </a:extLst>
+          </p:cNvPr>
+          <p:cNvPicPr>
+            <a:picLocks noChangeAspect="1"/>
+          </p:cNvPicPr>
+          <p:nvPr/>
+        </p:nvPicPr>
+        <p:blipFill>
+          <a:blip r:embed="rId13">
+            <a:duotone>
+              <a:schemeClr val="accent1">
+                <a:shade val="45000"/>
+                <a:satMod val="135000"/>
+              </a:schemeClr>
+              <a:prstClr val="white"/>
+            </a:duotone>
+            <a:extLst>
+              <a:ext uri="{28A0092B-C50C-407E-A947-70E740481C1C}">
+                <a14:useLocalDpi xmlns:a14="http://schemas.microsoft.com/office/drawing/2010/main" val="0"/>
+              </a:ext>
+            </a:extLst>
+          </a:blip>
+          <a:stretch>
+            <a:fillRect/>
+          </a:stretch>
+        </p:blipFill>
+        <p:spPr>
+          <a:xfrm rot="21406085">
+            <a:off x="2885790" y="2603870"/>
+            <a:ext cx="792093" cy="792093"/>
+          </a:xfrm>
+          <a:prstGeom prst="rect">
+            <a:avLst/>
+          </a:prstGeom>
+        </p:spPr>
+      </p:pic>
+      <p:pic>
+        <p:nvPicPr>
+          <p:cNvPr id="36" name="Imagen 35">
+            <a:extLst>
+              <a:ext uri="{FF2B5EF4-FFF2-40B4-BE49-F238E27FC236}">
+                <a16:creationId xmlns:a16="http://schemas.microsoft.com/office/drawing/2014/main" id="{666A181C-97BF-4D8A-9738-6D16CE97B041}"/>
+              </a:ext>
+            </a:extLst>
+          </p:cNvPr>
+          <p:cNvPicPr>
+            <a:picLocks noChangeAspect="1"/>
+          </p:cNvPicPr>
+          <p:nvPr/>
+        </p:nvPicPr>
+        <p:blipFill>
+          <a:blip r:embed="rId14">
+            <a:duotone>
+              <a:schemeClr val="accent1">
+                <a:shade val="45000"/>
+                <a:satMod val="135000"/>
+              </a:schemeClr>
+              <a:prstClr val="white"/>
+            </a:duotone>
+            <a:extLst>
+              <a:ext uri="{28A0092B-C50C-407E-A947-70E740481C1C}">
+                <a14:useLocalDpi xmlns:a14="http://schemas.microsoft.com/office/drawing/2010/main" val="0"/>
+              </a:ext>
+            </a:extLst>
+          </a:blip>
+          <a:stretch>
+            <a:fillRect/>
+          </a:stretch>
+        </p:blipFill>
+        <p:spPr>
+          <a:xfrm>
+            <a:off x="3230776" y="4551852"/>
+            <a:ext cx="778671" cy="778671"/>
+          </a:xfrm>
+          <a:prstGeom prst="rect">
+            <a:avLst/>
+          </a:prstGeom>
+        </p:spPr>
+      </p:pic>
+      <p:pic>
+        <p:nvPicPr>
+          <p:cNvPr id="37" name="Imagen 36">
+            <a:extLst>
+              <a:ext uri="{FF2B5EF4-FFF2-40B4-BE49-F238E27FC236}">
+                <a16:creationId xmlns:a16="http://schemas.microsoft.com/office/drawing/2014/main" id="{A41520F8-4363-43DD-9480-C4BE5DD8CD40}"/>
+              </a:ext>
+            </a:extLst>
+          </p:cNvPr>
+          <p:cNvPicPr>
+            <a:picLocks noChangeAspect="1"/>
+          </p:cNvPicPr>
+          <p:nvPr/>
+        </p:nvPicPr>
+        <p:blipFill>
+          <a:blip r:embed="rId15">
+            <a:duotone>
+              <a:schemeClr val="accent1">
+                <a:shade val="45000"/>
+                <a:satMod val="135000"/>
+              </a:schemeClr>
+              <a:prstClr val="white"/>
+            </a:duotone>
+            <a:extLst>
+              <a:ext uri="{28A0092B-C50C-407E-A947-70E740481C1C}">
+                <a14:useLocalDpi xmlns:a14="http://schemas.microsoft.com/office/drawing/2010/main" val="0"/>
+              </a:ext>
+            </a:extLst>
+          </a:blip>
+          <a:stretch>
+            <a:fillRect/>
+          </a:stretch>
+        </p:blipFill>
+        <p:spPr>
+          <a:xfrm rot="20412771">
+            <a:off x="9757614" y="2992408"/>
+            <a:ext cx="850510" cy="850510"/>
           </a:xfrm>
           <a:prstGeom prst="rect">
             <a:avLst/>
@@ -4094,7 +4550,7 @@
         </p:blipFill>
         <p:spPr>
           <a:xfrm>
-            <a:off x="1945454" y="4375975"/>
+            <a:off x="1738245" y="4091654"/>
             <a:ext cx="667042" cy="667042"/>
           </a:xfrm>
           <a:prstGeom prst="rect">
@@ -4137,7 +4593,7 @@
         </p:blipFill>
         <p:spPr>
           <a:xfrm rot="19351517">
-            <a:off x="3289055" y="576332"/>
+            <a:off x="2898451" y="735628"/>
             <a:ext cx="667042" cy="667042"/>
           </a:xfrm>
           <a:prstGeom prst="rect">
@@ -4180,7 +4636,7 @@
         </p:blipFill>
         <p:spPr>
           <a:xfrm rot="3484623">
-            <a:off x="1900513" y="2063845"/>
+            <a:off x="1351715" y="1993355"/>
             <a:ext cx="667042" cy="667042"/>
           </a:xfrm>
           <a:prstGeom prst="rect">
@@ -4223,7 +4679,7 @@
         </p:blipFill>
         <p:spPr>
           <a:xfrm rot="16492957">
-            <a:off x="9825060" y="4410801"/>
+            <a:off x="8999439" y="4521937"/>
             <a:ext cx="720000" cy="720000"/>
           </a:xfrm>
           <a:prstGeom prst="rect">
@@ -4266,8 +4722,8 @@
         </p:blipFill>
         <p:spPr>
           <a:xfrm>
-            <a:off x="8059694" y="643260"/>
-            <a:ext cx="570473" cy="570473"/>
+            <a:off x="8553807" y="690085"/>
+            <a:ext cx="658231" cy="658231"/>
           </a:xfrm>
           <a:prstGeom prst="rect">
             <a:avLst/>
@@ -4309,8 +4765,8 @@
         </p:blipFill>
         <p:spPr>
           <a:xfrm>
-            <a:off x="10690043" y="3087911"/>
-            <a:ext cx="574499" cy="574499"/>
+            <a:off x="10966202" y="2070824"/>
+            <a:ext cx="715490" cy="715490"/>
           </a:xfrm>
           <a:prstGeom prst="rect">
             <a:avLst/>
@@ -4352,8 +4808,8 @@
         </p:blipFill>
         <p:spPr>
           <a:xfrm>
-            <a:off x="8876248" y="2354298"/>
-            <a:ext cx="658231" cy="658231"/>
+            <a:off x="8445995" y="2269618"/>
+            <a:ext cx="715490" cy="715490"/>
           </a:xfrm>
           <a:prstGeom prst="rect">
             <a:avLst/>
@@ -4395,7 +4851,7 @@
         </p:blipFill>
         <p:spPr>
           <a:xfrm>
-            <a:off x="10382343" y="730631"/>
+            <a:off x="10726976" y="597641"/>
             <a:ext cx="715490" cy="715490"/>
           </a:xfrm>
           <a:prstGeom prst="rect">
@@ -4437,8 +4893,8 @@
           </a:stretch>
         </p:blipFill>
         <p:spPr>
-          <a:xfrm rot="16569488">
-            <a:off x="5584108" y="4518539"/>
+          <a:xfrm rot="4995169">
+            <a:off x="11180891" y="4008598"/>
             <a:ext cx="710803" cy="710803"/>
           </a:xfrm>
           <a:prstGeom prst="rect">
@@ -4483,6 +4939,135 @@
           <a:xfrm>
             <a:off x="472573" y="3259108"/>
             <a:ext cx="584802" cy="584802"/>
+          </a:xfrm>
+          <a:prstGeom prst="rect">
+            <a:avLst/>
+          </a:prstGeom>
+        </p:spPr>
+      </p:pic>
+      <p:pic>
+        <p:nvPicPr>
+          <p:cNvPr id="3" name="Imagen 2">
+            <a:extLst>
+              <a:ext uri="{FF2B5EF4-FFF2-40B4-BE49-F238E27FC236}">
+                <a16:creationId xmlns:a16="http://schemas.microsoft.com/office/drawing/2014/main" id="{81A538A7-C181-4CE2-9E2B-285FBD7138A3}"/>
+              </a:ext>
+            </a:extLst>
+          </p:cNvPr>
+          <p:cNvPicPr>
+            <a:picLocks noChangeAspect="1"/>
+          </p:cNvPicPr>
+          <p:nvPr/>
+        </p:nvPicPr>
+        <p:blipFill>
+          <a:blip r:embed="rId13">
+            <a:duotone>
+              <a:schemeClr val="accent1">
+                <a:shade val="45000"/>
+                <a:satMod val="135000"/>
+              </a:schemeClr>
+              <a:prstClr val="white"/>
+            </a:duotone>
+            <a:extLst>
+              <a:ext uri="{28A0092B-C50C-407E-A947-70E740481C1C}">
+                <a14:useLocalDpi xmlns:a14="http://schemas.microsoft.com/office/drawing/2010/main" val="0"/>
+              </a:ext>
+            </a:extLst>
+          </a:blip>
+          <a:stretch>
+            <a:fillRect/>
+          </a:stretch>
+        </p:blipFill>
+        <p:spPr>
+          <a:xfrm rot="21406085">
+            <a:off x="2885790" y="2603870"/>
+            <a:ext cx="792093" cy="792093"/>
+          </a:xfrm>
+          <a:prstGeom prst="rect">
+            <a:avLst/>
+          </a:prstGeom>
+        </p:spPr>
+      </p:pic>
+      <p:pic>
+        <p:nvPicPr>
+          <p:cNvPr id="5" name="Imagen 4">
+            <a:extLst>
+              <a:ext uri="{FF2B5EF4-FFF2-40B4-BE49-F238E27FC236}">
+                <a16:creationId xmlns:a16="http://schemas.microsoft.com/office/drawing/2014/main" id="{B69AB3BD-2550-4DA0-912A-B15E659D09B3}"/>
+              </a:ext>
+            </a:extLst>
+          </p:cNvPr>
+          <p:cNvPicPr>
+            <a:picLocks noChangeAspect="1"/>
+          </p:cNvPicPr>
+          <p:nvPr/>
+        </p:nvPicPr>
+        <p:blipFill>
+          <a:blip r:embed="rId14">
+            <a:duotone>
+              <a:schemeClr val="accent1">
+                <a:shade val="45000"/>
+                <a:satMod val="135000"/>
+              </a:schemeClr>
+              <a:prstClr val="white"/>
+            </a:duotone>
+            <a:extLst>
+              <a:ext uri="{28A0092B-C50C-407E-A947-70E740481C1C}">
+                <a14:useLocalDpi xmlns:a14="http://schemas.microsoft.com/office/drawing/2010/main" val="0"/>
+              </a:ext>
+            </a:extLst>
+          </a:blip>
+          <a:stretch>
+            <a:fillRect/>
+          </a:stretch>
+        </p:blipFill>
+        <p:spPr>
+          <a:xfrm>
+            <a:off x="3230776" y="4551852"/>
+            <a:ext cx="778671" cy="778671"/>
+          </a:xfrm>
+          <a:prstGeom prst="rect">
+            <a:avLst/>
+          </a:prstGeom>
+        </p:spPr>
+      </p:pic>
+      <p:pic>
+        <p:nvPicPr>
+          <p:cNvPr id="7" name="Imagen 6">
+            <a:extLst>
+              <a:ext uri="{FF2B5EF4-FFF2-40B4-BE49-F238E27FC236}">
+                <a16:creationId xmlns:a16="http://schemas.microsoft.com/office/drawing/2014/main" id="{85424FE2-A148-439A-8370-4279B604832A}"/>
+              </a:ext>
+            </a:extLst>
+          </p:cNvPr>
+          <p:cNvPicPr>
+            <a:picLocks noChangeAspect="1"/>
+          </p:cNvPicPr>
+          <p:nvPr/>
+        </p:nvPicPr>
+        <p:blipFill>
+          <a:blip r:embed="rId15">
+            <a:duotone>
+              <a:schemeClr val="accent1">
+                <a:shade val="45000"/>
+                <a:satMod val="135000"/>
+              </a:schemeClr>
+              <a:prstClr val="white"/>
+            </a:duotone>
+            <a:extLst>
+              <a:ext uri="{28A0092B-C50C-407E-A947-70E740481C1C}">
+                <a14:useLocalDpi xmlns:a14="http://schemas.microsoft.com/office/drawing/2010/main" val="0"/>
+              </a:ext>
+            </a:extLst>
+          </a:blip>
+          <a:stretch>
+            <a:fillRect/>
+          </a:stretch>
+        </p:blipFill>
+        <p:spPr>
+          <a:xfrm rot="20412771">
+            <a:off x="9757614" y="2992408"/>
+            <a:ext cx="850510" cy="850510"/>
           </a:xfrm>
           <a:prstGeom prst="rect">
             <a:avLst/>
@@ -4505,6 +5090,14 @@
 <file path=ppt/slides/slide3.xml><?xml version="1.0" encoding="utf-8"?>
 <p:sld xmlns:a="http://schemas.openxmlformats.org/drawingml/2006/main" xmlns:r="http://schemas.openxmlformats.org/officeDocument/2006/relationships" xmlns:p="http://schemas.openxmlformats.org/presentationml/2006/main">
   <p:cSld>
+    <p:bg>
+      <p:bgPr>
+        <a:solidFill>
+          <a:srgbClr val="EEE982"/>
+        </a:solidFill>
+        <a:effectLst/>
+      </p:bgPr>
+    </p:bg>
     <p:spTree>
       <p:nvGrpSpPr>
         <p:cNvPr id="1" name=""/>
@@ -4519,12 +5112,42 @@
           <a:chExt cx="0" cy="0"/>
         </a:xfrm>
       </p:grpSpPr>
+    </p:spTree>
+    <p:extLst>
+      <p:ext uri="{BB962C8B-B14F-4D97-AF65-F5344CB8AC3E}">
+        <p14:creationId xmlns:p14="http://schemas.microsoft.com/office/powerpoint/2010/main" val="4049901274"/>
+      </p:ext>
+    </p:extLst>
+  </p:cSld>
+  <p:clrMapOvr>
+    <a:masterClrMapping/>
+  </p:clrMapOvr>
+</p:sld>
+</file>
+
+<file path=ppt/slides/slide4.xml><?xml version="1.0" encoding="utf-8"?>
+<p:sld xmlns:a="http://schemas.openxmlformats.org/drawingml/2006/main" xmlns:r="http://schemas.openxmlformats.org/officeDocument/2006/relationships" xmlns:p="http://schemas.openxmlformats.org/presentationml/2006/main">
+  <p:cSld>
+    <p:spTree>
+      <p:nvGrpSpPr>
+        <p:cNvPr id="1" name=""/>
+        <p:cNvGrpSpPr/>
+        <p:nvPr/>
+      </p:nvGrpSpPr>
+      <p:grpSpPr>
+        <a:xfrm>
+          <a:off x="0" y="0"/>
+          <a:ext cx="0" cy="0"/>
+          <a:chOff x="0" y="0"/>
+          <a:chExt cx="0" cy="0"/>
+        </a:xfrm>
+      </p:grpSpPr>
       <p:sp>
         <p:nvSpPr>
           <p:cNvPr id="2" name="Título 1">
             <a:extLst>
               <a:ext uri="{FF2B5EF4-FFF2-40B4-BE49-F238E27FC236}">
-                <a16:creationId xmlns:a16="http://schemas.microsoft.com/office/drawing/2014/main" id="{489A420F-A68D-4C11-BF24-B5FD8DD97380}"/>
+                <a16:creationId xmlns:a16="http://schemas.microsoft.com/office/drawing/2014/main" id="{19154E99-8C1B-4A00-88C3-208B977241BD}"/>
               </a:ext>
             </a:extLst>
           </p:cNvPr>
@@ -4540,28 +5163,88 @@
           <a:bodyPr/>
           <a:lstStyle/>
           <a:p>
-            <a:endParaRPr lang="es-CO" dirty="0"/>
-          </a:p>
-        </p:txBody>
-      </p:sp>
+            <a:endParaRPr lang="es-CO"/>
+          </a:p>
+        </p:txBody>
+      </p:sp>
+      <p:sp>
+        <p:nvSpPr>
+          <p:cNvPr id="3" name="Marcador de contenido 2">
+            <a:extLst>
+              <a:ext uri="{FF2B5EF4-FFF2-40B4-BE49-F238E27FC236}">
+                <a16:creationId xmlns:a16="http://schemas.microsoft.com/office/drawing/2014/main" id="{FDE867A5-18F5-4829-A35D-DEA6B18C1548}"/>
+              </a:ext>
+            </a:extLst>
+          </p:cNvPr>
+          <p:cNvSpPr>
+            <a:spLocks noGrp="1"/>
+          </p:cNvSpPr>
+          <p:nvPr>
+            <p:ph idx="1"/>
+          </p:nvPr>
+        </p:nvSpPr>
+        <p:spPr/>
+        <p:txBody>
+          <a:bodyPr/>
+          <a:lstStyle/>
+          <a:p>
+            <a:endParaRPr lang="es-CO"/>
+          </a:p>
+        </p:txBody>
+      </p:sp>
+    </p:spTree>
+    <p:extLst>
+      <p:ext uri="{BB962C8B-B14F-4D97-AF65-F5344CB8AC3E}">
+        <p14:creationId xmlns:p14="http://schemas.microsoft.com/office/powerpoint/2010/main" val="1477808158"/>
+      </p:ext>
+    </p:extLst>
+  </p:cSld>
+  <p:clrMapOvr>
+    <a:masterClrMapping/>
+  </p:clrMapOvr>
+</p:sld>
+</file>
+
+<file path=ppt/slides/slide5.xml><?xml version="1.0" encoding="utf-8"?>
+<p:sld xmlns:a="http://schemas.openxmlformats.org/drawingml/2006/main" xmlns:r="http://schemas.openxmlformats.org/officeDocument/2006/relationships" xmlns:p="http://schemas.openxmlformats.org/presentationml/2006/main">
+  <p:cSld>
+    <p:spTree>
+      <p:nvGrpSpPr>
+        <p:cNvPr id="1" name=""/>
+        <p:cNvGrpSpPr/>
+        <p:nvPr/>
+      </p:nvGrpSpPr>
+      <p:grpSpPr>
+        <a:xfrm>
+          <a:off x="0" y="0"/>
+          <a:ext cx="0" cy="0"/>
+          <a:chOff x="0" y="0"/>
+          <a:chExt cx="0" cy="0"/>
+        </a:xfrm>
+      </p:grpSpPr>
       <p:pic>
         <p:nvPicPr>
-          <p:cNvPr id="5" name="Marcador de contenido 4">
+          <p:cNvPr id="10" name="Imagen 9">
             <a:extLst>
               <a:ext uri="{FF2B5EF4-FFF2-40B4-BE49-F238E27FC236}">
-                <a16:creationId xmlns:a16="http://schemas.microsoft.com/office/drawing/2014/main" id="{03D9CB79-1796-4CCC-B8C3-DA3747DD9C25}"/>
+                <a16:creationId xmlns:a16="http://schemas.microsoft.com/office/drawing/2014/main" id="{F220285D-A771-41C1-AFE3-C90770ACDE25}"/>
               </a:ext>
             </a:extLst>
           </p:cNvPr>
           <p:cNvPicPr>
-            <a:picLocks noGrp="1" noChangeAspect="1"/>
+            <a:picLocks noChangeAspect="1"/>
           </p:cNvPicPr>
-          <p:nvPr>
-            <p:ph idx="1"/>
-          </p:nvPr>
+          <p:nvPr/>
         </p:nvPicPr>
         <p:blipFill>
           <a:blip r:embed="rId2">
+            <a:duotone>
+              <a:schemeClr val="accent1">
+                <a:shade val="45000"/>
+                <a:satMod val="135000"/>
+              </a:schemeClr>
+              <a:prstClr val="white"/>
+            </a:duotone>
             <a:extLst>
               <a:ext uri="{28A0092B-C50C-407E-A947-70E740481C1C}">
                 <a14:useLocalDpi xmlns:a14="http://schemas.microsoft.com/office/drawing/2010/main" val="0"/>
@@ -4574,8 +5257,531 @@
         </p:blipFill>
         <p:spPr>
           <a:xfrm>
-            <a:off x="3162022" y="3364855"/>
-            <a:ext cx="6420699" cy="1473475"/>
+            <a:off x="1107279" y="554483"/>
+            <a:ext cx="720001" cy="720001"/>
+          </a:xfrm>
+          <a:prstGeom prst="rect">
+            <a:avLst/>
+          </a:prstGeom>
+        </p:spPr>
+      </p:pic>
+      <p:pic>
+        <p:nvPicPr>
+          <p:cNvPr id="11" name="Imagen 10">
+            <a:extLst>
+              <a:ext uri="{FF2B5EF4-FFF2-40B4-BE49-F238E27FC236}">
+                <a16:creationId xmlns:a16="http://schemas.microsoft.com/office/drawing/2014/main" id="{7E29A13A-3414-4354-8B05-03B021ED58A1}"/>
+              </a:ext>
+            </a:extLst>
+          </p:cNvPr>
+          <p:cNvPicPr>
+            <a:picLocks noChangeAspect="1"/>
+          </p:cNvPicPr>
+          <p:nvPr/>
+        </p:nvPicPr>
+        <p:blipFill>
+          <a:blip r:embed="rId3">
+            <a:duotone>
+              <a:schemeClr val="accent1">
+                <a:shade val="45000"/>
+                <a:satMod val="135000"/>
+              </a:schemeClr>
+              <a:prstClr val="white"/>
+            </a:duotone>
+            <a:extLst>
+              <a:ext uri="{28A0092B-C50C-407E-A947-70E740481C1C}">
+                <a14:useLocalDpi xmlns:a14="http://schemas.microsoft.com/office/drawing/2010/main" val="0"/>
+              </a:ext>
+            </a:extLst>
+          </a:blip>
+          <a:stretch>
+            <a:fillRect/>
+          </a:stretch>
+        </p:blipFill>
+        <p:spPr>
+          <a:xfrm>
+            <a:off x="1945454" y="4375975"/>
+            <a:ext cx="667042" cy="667042"/>
+          </a:xfrm>
+          <a:prstGeom prst="rect">
+            <a:avLst/>
+          </a:prstGeom>
+        </p:spPr>
+      </p:pic>
+      <p:pic>
+        <p:nvPicPr>
+          <p:cNvPr id="12" name="Imagen 11">
+            <a:extLst>
+              <a:ext uri="{FF2B5EF4-FFF2-40B4-BE49-F238E27FC236}">
+                <a16:creationId xmlns:a16="http://schemas.microsoft.com/office/drawing/2014/main" id="{9D710476-8C3B-44C5-95FD-63FD2B0D4F0A}"/>
+              </a:ext>
+            </a:extLst>
+          </p:cNvPr>
+          <p:cNvPicPr>
+            <a:picLocks noChangeAspect="1"/>
+          </p:cNvPicPr>
+          <p:nvPr/>
+        </p:nvPicPr>
+        <p:blipFill>
+          <a:blip r:embed="rId4">
+            <a:duotone>
+              <a:schemeClr val="accent1">
+                <a:shade val="45000"/>
+                <a:satMod val="135000"/>
+              </a:schemeClr>
+              <a:prstClr val="white"/>
+            </a:duotone>
+            <a:extLst>
+              <a:ext uri="{28A0092B-C50C-407E-A947-70E740481C1C}">
+                <a14:useLocalDpi xmlns:a14="http://schemas.microsoft.com/office/drawing/2010/main" val="0"/>
+              </a:ext>
+            </a:extLst>
+          </a:blip>
+          <a:stretch>
+            <a:fillRect/>
+          </a:stretch>
+        </p:blipFill>
+        <p:spPr>
+          <a:xfrm rot="19351517">
+            <a:off x="3289055" y="576332"/>
+            <a:ext cx="667042" cy="667042"/>
+          </a:xfrm>
+          <a:prstGeom prst="rect">
+            <a:avLst/>
+          </a:prstGeom>
+        </p:spPr>
+      </p:pic>
+      <p:pic>
+        <p:nvPicPr>
+          <p:cNvPr id="13" name="Imagen 12">
+            <a:extLst>
+              <a:ext uri="{FF2B5EF4-FFF2-40B4-BE49-F238E27FC236}">
+                <a16:creationId xmlns:a16="http://schemas.microsoft.com/office/drawing/2014/main" id="{7501DBB9-B5CB-45E8-A48E-4ACDCE7ECB5B}"/>
+              </a:ext>
+            </a:extLst>
+          </p:cNvPr>
+          <p:cNvPicPr>
+            <a:picLocks noChangeAspect="1"/>
+          </p:cNvPicPr>
+          <p:nvPr/>
+        </p:nvPicPr>
+        <p:blipFill>
+          <a:blip r:embed="rId5">
+            <a:duotone>
+              <a:schemeClr val="accent1">
+                <a:shade val="45000"/>
+                <a:satMod val="135000"/>
+              </a:schemeClr>
+              <a:prstClr val="white"/>
+            </a:duotone>
+            <a:extLst>
+              <a:ext uri="{28A0092B-C50C-407E-A947-70E740481C1C}">
+                <a14:useLocalDpi xmlns:a14="http://schemas.microsoft.com/office/drawing/2010/main" val="0"/>
+              </a:ext>
+            </a:extLst>
+          </a:blip>
+          <a:stretch>
+            <a:fillRect/>
+          </a:stretch>
+        </p:blipFill>
+        <p:spPr>
+          <a:xfrm rot="3484623">
+            <a:off x="1900513" y="2063845"/>
+            <a:ext cx="667042" cy="667042"/>
+          </a:xfrm>
+          <a:prstGeom prst="rect">
+            <a:avLst/>
+          </a:prstGeom>
+        </p:spPr>
+      </p:pic>
+      <p:pic>
+        <p:nvPicPr>
+          <p:cNvPr id="14" name="Imagen 13">
+            <a:extLst>
+              <a:ext uri="{FF2B5EF4-FFF2-40B4-BE49-F238E27FC236}">
+                <a16:creationId xmlns:a16="http://schemas.microsoft.com/office/drawing/2014/main" id="{5ADA86BC-5186-4C26-82D1-B3AB6601100D}"/>
+              </a:ext>
+            </a:extLst>
+          </p:cNvPr>
+          <p:cNvPicPr>
+            <a:picLocks noChangeAspect="1"/>
+          </p:cNvPicPr>
+          <p:nvPr/>
+        </p:nvPicPr>
+        <p:blipFill>
+          <a:blip r:embed="rId6">
+            <a:duotone>
+              <a:schemeClr val="accent1">
+                <a:shade val="45000"/>
+                <a:satMod val="135000"/>
+              </a:schemeClr>
+              <a:prstClr val="white"/>
+            </a:duotone>
+            <a:extLst>
+              <a:ext uri="{28A0092B-C50C-407E-A947-70E740481C1C}">
+                <a14:useLocalDpi xmlns:a14="http://schemas.microsoft.com/office/drawing/2010/main" val="0"/>
+              </a:ext>
+            </a:extLst>
+          </a:blip>
+          <a:stretch>
+            <a:fillRect/>
+          </a:stretch>
+        </p:blipFill>
+        <p:spPr>
+          <a:xfrm rot="16492957">
+            <a:off x="9825060" y="4410801"/>
+            <a:ext cx="720000" cy="720000"/>
+          </a:xfrm>
+          <a:prstGeom prst="rect">
+            <a:avLst/>
+          </a:prstGeom>
+        </p:spPr>
+      </p:pic>
+      <p:pic>
+        <p:nvPicPr>
+          <p:cNvPr id="15" name="Imagen 14">
+            <a:extLst>
+              <a:ext uri="{FF2B5EF4-FFF2-40B4-BE49-F238E27FC236}">
+                <a16:creationId xmlns:a16="http://schemas.microsoft.com/office/drawing/2014/main" id="{4ECF6A80-1ADA-438A-862F-62C5E8C409CD}"/>
+              </a:ext>
+            </a:extLst>
+          </p:cNvPr>
+          <p:cNvPicPr>
+            <a:picLocks noChangeAspect="1"/>
+          </p:cNvPicPr>
+          <p:nvPr/>
+        </p:nvPicPr>
+        <p:blipFill>
+          <a:blip r:embed="rId7">
+            <a:duotone>
+              <a:schemeClr val="accent1">
+                <a:shade val="45000"/>
+                <a:satMod val="135000"/>
+              </a:schemeClr>
+              <a:prstClr val="white"/>
+            </a:duotone>
+            <a:extLst>
+              <a:ext uri="{28A0092B-C50C-407E-A947-70E740481C1C}">
+                <a14:useLocalDpi xmlns:a14="http://schemas.microsoft.com/office/drawing/2010/main" val="0"/>
+              </a:ext>
+            </a:extLst>
+          </a:blip>
+          <a:stretch>
+            <a:fillRect/>
+          </a:stretch>
+        </p:blipFill>
+        <p:spPr>
+          <a:xfrm>
+            <a:off x="8059694" y="643260"/>
+            <a:ext cx="570473" cy="570473"/>
+          </a:xfrm>
+          <a:prstGeom prst="rect">
+            <a:avLst/>
+          </a:prstGeom>
+        </p:spPr>
+      </p:pic>
+      <p:pic>
+        <p:nvPicPr>
+          <p:cNvPr id="16" name="Imagen 15">
+            <a:extLst>
+              <a:ext uri="{FF2B5EF4-FFF2-40B4-BE49-F238E27FC236}">
+                <a16:creationId xmlns:a16="http://schemas.microsoft.com/office/drawing/2014/main" id="{25ACDAC8-345C-4877-ABE0-6866E240CB06}"/>
+              </a:ext>
+            </a:extLst>
+          </p:cNvPr>
+          <p:cNvPicPr>
+            <a:picLocks noChangeAspect="1"/>
+          </p:cNvPicPr>
+          <p:nvPr/>
+        </p:nvPicPr>
+        <p:blipFill>
+          <a:blip r:embed="rId8">
+            <a:duotone>
+              <a:schemeClr val="accent1">
+                <a:shade val="45000"/>
+                <a:satMod val="135000"/>
+              </a:schemeClr>
+              <a:prstClr val="white"/>
+            </a:duotone>
+            <a:extLst>
+              <a:ext uri="{28A0092B-C50C-407E-A947-70E740481C1C}">
+                <a14:useLocalDpi xmlns:a14="http://schemas.microsoft.com/office/drawing/2010/main" val="0"/>
+              </a:ext>
+            </a:extLst>
+          </a:blip>
+          <a:stretch>
+            <a:fillRect/>
+          </a:stretch>
+        </p:blipFill>
+        <p:spPr>
+          <a:xfrm>
+            <a:off x="10690043" y="3087911"/>
+            <a:ext cx="574499" cy="574499"/>
+          </a:xfrm>
+          <a:prstGeom prst="rect">
+            <a:avLst/>
+          </a:prstGeom>
+        </p:spPr>
+      </p:pic>
+      <p:pic>
+        <p:nvPicPr>
+          <p:cNvPr id="17" name="Imagen 16">
+            <a:extLst>
+              <a:ext uri="{FF2B5EF4-FFF2-40B4-BE49-F238E27FC236}">
+                <a16:creationId xmlns:a16="http://schemas.microsoft.com/office/drawing/2014/main" id="{9D10DD1E-B612-4760-A260-62DEEFD25C68}"/>
+              </a:ext>
+            </a:extLst>
+          </p:cNvPr>
+          <p:cNvPicPr>
+            <a:picLocks noChangeAspect="1"/>
+          </p:cNvPicPr>
+          <p:nvPr/>
+        </p:nvPicPr>
+        <p:blipFill>
+          <a:blip r:embed="rId9">
+            <a:duotone>
+              <a:schemeClr val="accent1">
+                <a:shade val="45000"/>
+                <a:satMod val="135000"/>
+              </a:schemeClr>
+              <a:prstClr val="white"/>
+            </a:duotone>
+            <a:extLst>
+              <a:ext uri="{28A0092B-C50C-407E-A947-70E740481C1C}">
+                <a14:useLocalDpi xmlns:a14="http://schemas.microsoft.com/office/drawing/2010/main" val="0"/>
+              </a:ext>
+            </a:extLst>
+          </a:blip>
+          <a:stretch>
+            <a:fillRect/>
+          </a:stretch>
+        </p:blipFill>
+        <p:spPr>
+          <a:xfrm>
+            <a:off x="8876248" y="2354298"/>
+            <a:ext cx="658231" cy="658231"/>
+          </a:xfrm>
+          <a:prstGeom prst="rect">
+            <a:avLst/>
+          </a:prstGeom>
+        </p:spPr>
+      </p:pic>
+      <p:pic>
+        <p:nvPicPr>
+          <p:cNvPr id="18" name="Imagen 17">
+            <a:extLst>
+              <a:ext uri="{FF2B5EF4-FFF2-40B4-BE49-F238E27FC236}">
+                <a16:creationId xmlns:a16="http://schemas.microsoft.com/office/drawing/2014/main" id="{4B32FC9D-2693-4212-8204-6242DAD387C4}"/>
+              </a:ext>
+            </a:extLst>
+          </p:cNvPr>
+          <p:cNvPicPr>
+            <a:picLocks noChangeAspect="1"/>
+          </p:cNvPicPr>
+          <p:nvPr/>
+        </p:nvPicPr>
+        <p:blipFill>
+          <a:blip r:embed="rId10">
+            <a:duotone>
+              <a:schemeClr val="accent1">
+                <a:shade val="45000"/>
+                <a:satMod val="135000"/>
+              </a:schemeClr>
+              <a:prstClr val="white"/>
+            </a:duotone>
+            <a:extLst>
+              <a:ext uri="{28A0092B-C50C-407E-A947-70E740481C1C}">
+                <a14:useLocalDpi xmlns:a14="http://schemas.microsoft.com/office/drawing/2010/main" val="0"/>
+              </a:ext>
+            </a:extLst>
+          </a:blip>
+          <a:stretch>
+            <a:fillRect/>
+          </a:stretch>
+        </p:blipFill>
+        <p:spPr>
+          <a:xfrm>
+            <a:off x="10382343" y="730631"/>
+            <a:ext cx="715490" cy="715490"/>
+          </a:xfrm>
+          <a:prstGeom prst="rect">
+            <a:avLst/>
+          </a:prstGeom>
+        </p:spPr>
+      </p:pic>
+      <p:pic>
+        <p:nvPicPr>
+          <p:cNvPr id="19" name="Imagen 18">
+            <a:extLst>
+              <a:ext uri="{FF2B5EF4-FFF2-40B4-BE49-F238E27FC236}">
+                <a16:creationId xmlns:a16="http://schemas.microsoft.com/office/drawing/2014/main" id="{17CC7011-0182-44FA-B6BF-EDE81343FB12}"/>
+              </a:ext>
+            </a:extLst>
+          </p:cNvPr>
+          <p:cNvPicPr>
+            <a:picLocks noChangeAspect="1"/>
+          </p:cNvPicPr>
+          <p:nvPr/>
+        </p:nvPicPr>
+        <p:blipFill>
+          <a:blip r:embed="rId11">
+            <a:duotone>
+              <a:schemeClr val="accent1">
+                <a:shade val="45000"/>
+                <a:satMod val="135000"/>
+              </a:schemeClr>
+              <a:prstClr val="white"/>
+            </a:duotone>
+            <a:extLst>
+              <a:ext uri="{28A0092B-C50C-407E-A947-70E740481C1C}">
+                <a14:useLocalDpi xmlns:a14="http://schemas.microsoft.com/office/drawing/2010/main" val="0"/>
+              </a:ext>
+            </a:extLst>
+          </a:blip>
+          <a:stretch>
+            <a:fillRect/>
+          </a:stretch>
+        </p:blipFill>
+        <p:spPr>
+          <a:xfrm rot="16569488">
+            <a:off x="5584108" y="4518539"/>
+            <a:ext cx="710803" cy="710803"/>
+          </a:xfrm>
+          <a:prstGeom prst="rect">
+            <a:avLst/>
+          </a:prstGeom>
+        </p:spPr>
+      </p:pic>
+      <p:pic>
+        <p:nvPicPr>
+          <p:cNvPr id="20" name="Imagen 19">
+            <a:extLst>
+              <a:ext uri="{FF2B5EF4-FFF2-40B4-BE49-F238E27FC236}">
+                <a16:creationId xmlns:a16="http://schemas.microsoft.com/office/drawing/2014/main" id="{462939C3-7C8B-40FA-B091-0CEC65B18EA1}"/>
+              </a:ext>
+            </a:extLst>
+          </p:cNvPr>
+          <p:cNvPicPr>
+            <a:picLocks noChangeAspect="1"/>
+          </p:cNvPicPr>
+          <p:nvPr/>
+        </p:nvPicPr>
+        <p:blipFill>
+          <a:blip r:embed="rId12">
+            <a:duotone>
+              <a:schemeClr val="accent1">
+                <a:shade val="45000"/>
+                <a:satMod val="135000"/>
+              </a:schemeClr>
+              <a:prstClr val="white"/>
+            </a:duotone>
+            <a:extLst>
+              <a:ext uri="{28A0092B-C50C-407E-A947-70E740481C1C}">
+                <a14:useLocalDpi xmlns:a14="http://schemas.microsoft.com/office/drawing/2010/main" val="0"/>
+              </a:ext>
+            </a:extLst>
+          </a:blip>
+          <a:stretch>
+            <a:fillRect/>
+          </a:stretch>
+        </p:blipFill>
+        <p:spPr>
+          <a:xfrm>
+            <a:off x="472573" y="3259108"/>
+            <a:ext cx="584802" cy="584802"/>
+          </a:xfrm>
+          <a:prstGeom prst="rect">
+            <a:avLst/>
+          </a:prstGeom>
+        </p:spPr>
+      </p:pic>
+    </p:spTree>
+    <p:extLst>
+      <p:ext uri="{BB962C8B-B14F-4D97-AF65-F5344CB8AC3E}">
+        <p14:creationId xmlns:p14="http://schemas.microsoft.com/office/powerpoint/2010/main" val="3500719829"/>
+      </p:ext>
+    </p:extLst>
+  </p:cSld>
+  <p:clrMapOvr>
+    <a:masterClrMapping/>
+  </p:clrMapOvr>
+</p:sld>
+</file>
+
+<file path=ppt/slides/slide6.xml><?xml version="1.0" encoding="utf-8"?>
+<p:sld xmlns:a="http://schemas.openxmlformats.org/drawingml/2006/main" xmlns:r="http://schemas.openxmlformats.org/officeDocument/2006/relationships" xmlns:p="http://schemas.openxmlformats.org/presentationml/2006/main">
+  <p:cSld>
+    <p:spTree>
+      <p:nvGrpSpPr>
+        <p:cNvPr id="1" name=""/>
+        <p:cNvGrpSpPr/>
+        <p:nvPr/>
+      </p:nvGrpSpPr>
+      <p:grpSpPr>
+        <a:xfrm>
+          <a:off x="0" y="0"/>
+          <a:ext cx="0" cy="0"/>
+          <a:chOff x="0" y="0"/>
+          <a:chExt cx="0" cy="0"/>
+        </a:xfrm>
+      </p:grpSpPr>
+      <p:sp>
+        <p:nvSpPr>
+          <p:cNvPr id="2" name="Título 1">
+            <a:extLst>
+              <a:ext uri="{FF2B5EF4-FFF2-40B4-BE49-F238E27FC236}">
+                <a16:creationId xmlns:a16="http://schemas.microsoft.com/office/drawing/2014/main" id="{489A420F-A68D-4C11-BF24-B5FD8DD97380}"/>
+              </a:ext>
+            </a:extLst>
+          </p:cNvPr>
+          <p:cNvSpPr>
+            <a:spLocks noGrp="1"/>
+          </p:cNvSpPr>
+          <p:nvPr>
+            <p:ph type="title"/>
+          </p:nvPr>
+        </p:nvSpPr>
+        <p:spPr/>
+        <p:txBody>
+          <a:bodyPr/>
+          <a:lstStyle/>
+          <a:p>
+            <a:endParaRPr lang="es-CO" dirty="0"/>
+          </a:p>
+        </p:txBody>
+      </p:sp>
+      <p:pic>
+        <p:nvPicPr>
+          <p:cNvPr id="5" name="Marcador de contenido 4">
+            <a:extLst>
+              <a:ext uri="{FF2B5EF4-FFF2-40B4-BE49-F238E27FC236}">
+                <a16:creationId xmlns:a16="http://schemas.microsoft.com/office/drawing/2014/main" id="{03D9CB79-1796-4CCC-B8C3-DA3747DD9C25}"/>
+              </a:ext>
+            </a:extLst>
+          </p:cNvPr>
+          <p:cNvPicPr>
+            <a:picLocks noGrp="1" noChangeAspect="1"/>
+          </p:cNvPicPr>
+          <p:nvPr>
+            <p:ph idx="1"/>
+          </p:nvPr>
+        </p:nvPicPr>
+        <p:blipFill>
+          <a:blip r:embed="rId2">
+            <a:extLst>
+              <a:ext uri="{28A0092B-C50C-407E-A947-70E740481C1C}">
+                <a14:useLocalDpi xmlns:a14="http://schemas.microsoft.com/office/drawing/2010/main" val="0"/>
+              </a:ext>
+            </a:extLst>
+          </a:blip>
+          <a:stretch>
+            <a:fillRect/>
+          </a:stretch>
+        </p:blipFill>
+        <p:spPr>
+          <a:xfrm>
+            <a:off x="676275" y="2661005"/>
+            <a:ext cx="10753725" cy="2467853"/>
           </a:xfrm>
         </p:spPr>
       </p:pic>
@@ -4595,7 +5801,7 @@
 <file path=ppt/theme/theme1.xml><?xml version="1.0" encoding="utf-8"?>
 <a:theme xmlns:a="http://schemas.openxmlformats.org/drawingml/2006/main" name="Metropolitano">
   <a:themeElements>
-    <a:clrScheme name="Amarillo">
+    <a:clrScheme name="Metropolitano">
       <a:dk1>
         <a:sysClr val="windowText" lastClr="000000"/>
       </a:dk1>
@@ -4603,34 +5809,34 @@
         <a:sysClr val="window" lastClr="FFFFFF"/>
       </a:lt1>
       <a:dk2>
-        <a:srgbClr val="39302A"/>
+        <a:srgbClr val="162F33"/>
       </a:dk2>
       <a:lt2>
-        <a:srgbClr val="E5DEDB"/>
+        <a:srgbClr val="EAF0E0"/>
       </a:lt2>
       <a:accent1>
-        <a:srgbClr val="FFCA08"/>
+        <a:srgbClr val="50B4C8"/>
       </a:accent1>
       <a:accent2>
-        <a:srgbClr val="F8931D"/>
+        <a:srgbClr val="A8B97F"/>
       </a:accent2>
       <a:accent3>
-        <a:srgbClr val="CE8D3E"/>
+        <a:srgbClr val="9B9256"/>
       </a:accent3>
       <a:accent4>
-        <a:srgbClr val="EC7016"/>
+        <a:srgbClr val="657689"/>
       </a:accent4>
       <a:accent5>
-        <a:srgbClr val="E64823"/>
+        <a:srgbClr val="7A855D"/>
       </a:accent5>
       <a:accent6>
-        <a:srgbClr val="9C6A6A"/>
+        <a:srgbClr val="84AC9D"/>
       </a:accent6>
       <a:hlink>
-        <a:srgbClr val="2998E3"/>
+        <a:srgbClr val="2370CD"/>
       </a:hlink>
       <a:folHlink>
-        <a:srgbClr val="7F723D"/>
+        <a:srgbClr val="877589"/>
       </a:folHlink>
     </a:clrScheme>
     <a:fontScheme name="Metropolitano">
@@ -4823,7 +6029,7 @@
   <a:extraClrSchemeLst/>
   <a:extLst>
     <a:ext uri="{05A4C25C-085E-4340-85A3-A5531E510DB2}">
-      <thm15:themeFamily xmlns:thm15="http://schemas.microsoft.com/office/thememl/2012/main" name="Metropolitan" id="{4C5440D6-04D2-4954-96CF-F251137069B2}" vid="{0941A018-FB9B-4401-A32C-7E04526866E0}"/>
+      <thm15:themeFamily xmlns:thm15="http://schemas.microsoft.com/office/thememl/2012/main" name="Metropolitan" id="{4C5440D6-04D2-4954-96CF-F251137069B2}" vid="{79CFCA13-9412-4290-BB4B-85112F88857B}"/>
     </a:ext>
   </a:extLst>
 </a:theme>

</xml_diff>